<commit_message>
chapter 1 and 4 ok
</commit_message>
<xml_diff>
--- a/images/Helikopter.pptx
+++ b/images/Helikopter.pptx
@@ -1,13 +1,13 @@
 
 <file path=ppt/presentation.xml><?xml version="1.0" encoding="utf-8"?>
-<p:presentation xmlns:a="http://schemas.openxmlformats.org/drawingml/2006/main" xmlns:r="http://schemas.openxmlformats.org/officeDocument/2006/relationships" xmlns:p="http://schemas.openxmlformats.org/presentationml/2006/main" saveSubsetFonts="1">
+<p:presentation xmlns:a="http://schemas.openxmlformats.org/drawingml/2006/main" xmlns:r="http://schemas.openxmlformats.org/officeDocument/2006/relationships" xmlns:p="http://schemas.openxmlformats.org/presentationml/2006/main">
   <p:sldMasterIdLst>
     <p:sldMasterId id="2147483648" r:id="rId1"/>
   </p:sldMasterIdLst>
   <p:sldIdLst>
-    <p:sldId id="256" r:id="rId2"/>
+    <p:sldId id="256" r:id="rId3"/>
   </p:sldIdLst>
-  <p:sldSz cx="12192000" cy="6858000"/>
+  <p:sldSz cx="5713095" cy="6858000"/>
   <p:notesSz cx="6858000" cy="9144000"/>
   <p:defaultTextStyle>
     <a:defPPr>
@@ -131,20 +131,20 @@
             <a:spLocks noGrp="1"/>
           </p:cNvSpPr>
           <p:nvPr>
-            <p:ph type="ctrTitle"/>
+            <p:ph type="ctrTitle" hasCustomPrompt="1"/>
           </p:nvPr>
         </p:nvSpPr>
         <p:spPr>
           <a:xfrm>
-            <a:off x="1524000" y="1122363"/>
-            <a:ext cx="9144000" cy="2387600"/>
+            <a:off x="714150" y="1122363"/>
+            <a:ext cx="4284900" cy="2387600"/>
           </a:xfrm>
         </p:spPr>
         <p:txBody>
           <a:bodyPr anchor="b"/>
           <a:lstStyle>
             <a:lvl1pPr algn="ctr">
-              <a:defRPr sz="6000"/>
+              <a:defRPr sz="3750"/>
             </a:lvl1pPr>
           </a:lstStyle>
           <a:p>
@@ -163,13 +163,13 @@
             <a:spLocks noGrp="1"/>
           </p:cNvSpPr>
           <p:nvPr>
-            <p:ph type="subTitle" idx="1"/>
+            <p:ph type="subTitle" idx="1" hasCustomPrompt="1"/>
           </p:nvPr>
         </p:nvSpPr>
         <p:spPr>
           <a:xfrm>
-            <a:off x="1524000" y="3602038"/>
-            <a:ext cx="9144000" cy="1655762"/>
+            <a:off x="714150" y="3602038"/>
+            <a:ext cx="4284900" cy="1655762"/>
           </a:xfrm>
         </p:spPr>
         <p:txBody>
@@ -177,39 +177,39 @@
           <a:lstStyle>
             <a:lvl1pPr marL="0" indent="0" algn="ctr">
               <a:buNone/>
-              <a:defRPr sz="2400"/>
+              <a:defRPr sz="1500"/>
             </a:lvl1pPr>
-            <a:lvl2pPr marL="457200" indent="0" algn="ctr">
-              <a:buNone/>
-              <a:defRPr sz="2000"/>
+            <a:lvl2pPr marL="285750" indent="0" algn="ctr">
+              <a:buNone/>
+              <a:defRPr sz="1250"/>
             </a:lvl2pPr>
-            <a:lvl3pPr marL="914400" indent="0" algn="ctr">
-              <a:buNone/>
-              <a:defRPr sz="1800"/>
+            <a:lvl3pPr marL="571500" indent="0" algn="ctr">
+              <a:buNone/>
+              <a:defRPr sz="1125"/>
             </a:lvl3pPr>
-            <a:lvl4pPr marL="1371600" indent="0" algn="ctr">
-              <a:buNone/>
-              <a:defRPr sz="1600"/>
+            <a:lvl4pPr marL="857250" indent="0" algn="ctr">
+              <a:buNone/>
+              <a:defRPr sz="1000"/>
             </a:lvl4pPr>
-            <a:lvl5pPr marL="1828800" indent="0" algn="ctr">
-              <a:buNone/>
-              <a:defRPr sz="1600"/>
+            <a:lvl5pPr marL="1142365" indent="0" algn="ctr">
+              <a:buNone/>
+              <a:defRPr sz="1000"/>
             </a:lvl5pPr>
-            <a:lvl6pPr marL="2286000" indent="0" algn="ctr">
-              <a:buNone/>
-              <a:defRPr sz="1600"/>
+            <a:lvl6pPr marL="1428115" indent="0" algn="ctr">
+              <a:buNone/>
+              <a:defRPr sz="1000"/>
             </a:lvl6pPr>
-            <a:lvl7pPr marL="2743200" indent="0" algn="ctr">
-              <a:buNone/>
-              <a:defRPr sz="1600"/>
+            <a:lvl7pPr marL="1713865" indent="0" algn="ctr">
+              <a:buNone/>
+              <a:defRPr sz="1000"/>
             </a:lvl7pPr>
-            <a:lvl8pPr marL="3200400" indent="0" algn="ctr">
-              <a:buNone/>
-              <a:defRPr sz="1600"/>
+            <a:lvl8pPr marL="1999615" indent="0" algn="ctr">
+              <a:buNone/>
+              <a:defRPr sz="1000"/>
             </a:lvl8pPr>
-            <a:lvl9pPr marL="3657600" indent="0" algn="ctr">
-              <a:buNone/>
-              <a:defRPr sz="1600"/>
+            <a:lvl9pPr marL="2285365" indent="0" algn="ctr">
+              <a:buNone/>
+              <a:defRPr sz="1000"/>
             </a:lvl9pPr>
           </a:lstStyle>
           <a:p>
@@ -238,7 +238,6 @@
           <a:p>
             <a:fld id="{C2ADCA39-2348-471A-8528-7B6A933769FF}" type="datetimeFigureOut">
               <a:rPr lang="de-DE" smtClean="0"/>
-              <a:t>26.10.2016</a:t>
             </a:fld>
             <a:endParaRPr lang="de-DE"/>
           </a:p>
@@ -280,18 +279,12 @@
           <a:p>
             <a:fld id="{0FB62DCA-0B20-42A2-BB4B-D17462E2EB2D}" type="slidenum">
               <a:rPr lang="de-DE" smtClean="0"/>
-              <a:t>‹Nr.›</a:t>
             </a:fld>
             <a:endParaRPr lang="de-DE"/>
           </a:p>
         </p:txBody>
       </p:sp>
     </p:spTree>
-    <p:extLst>
-      <p:ext uri="{BB962C8B-B14F-4D97-AF65-F5344CB8AC3E}">
-        <p14:creationId xmlns:p14="http://schemas.microsoft.com/office/powerpoint/2010/main" val="4015789201"/>
-      </p:ext>
-    </p:extLst>
   </p:cSld>
   <p:clrMapOvr>
     <a:masterClrMapping/>
@@ -323,7 +316,7 @@
             <a:spLocks noGrp="1"/>
           </p:cNvSpPr>
           <p:nvPr>
-            <p:ph type="title"/>
+            <p:ph type="title" hasCustomPrompt="1"/>
           </p:nvPr>
         </p:nvSpPr>
         <p:spPr/>
@@ -346,7 +339,7 @@
             <a:spLocks noGrp="1"/>
           </p:cNvSpPr>
           <p:nvPr>
-            <p:ph type="body" orient="vert" idx="1"/>
+            <p:ph type="body" orient="vert" idx="1" hasCustomPrompt="1"/>
           </p:nvPr>
         </p:nvSpPr>
         <p:spPr/>
@@ -359,6 +352,7 @@
               <a:rPr lang="de-DE" smtClean="0"/>
               <a:t>Textmasterformat bearbeiten</a:t>
             </a:r>
+            <a:endParaRPr lang="de-DE" smtClean="0"/>
           </a:p>
           <a:p>
             <a:pPr lvl="1"/>
@@ -366,6 +360,7 @@
               <a:rPr lang="de-DE" smtClean="0"/>
               <a:t>Zweite Ebene</a:t>
             </a:r>
+            <a:endParaRPr lang="de-DE" smtClean="0"/>
           </a:p>
           <a:p>
             <a:pPr lvl="2"/>
@@ -373,6 +368,7 @@
               <a:rPr lang="de-DE" smtClean="0"/>
               <a:t>Dritte Ebene</a:t>
             </a:r>
+            <a:endParaRPr lang="de-DE" smtClean="0"/>
           </a:p>
           <a:p>
             <a:pPr lvl="3"/>
@@ -380,6 +376,7 @@
               <a:rPr lang="de-DE" smtClean="0"/>
               <a:t>Vierte Ebene</a:t>
             </a:r>
+            <a:endParaRPr lang="de-DE" smtClean="0"/>
           </a:p>
           <a:p>
             <a:pPr lvl="4"/>
@@ -408,7 +405,6 @@
           <a:p>
             <a:fld id="{C2ADCA39-2348-471A-8528-7B6A933769FF}" type="datetimeFigureOut">
               <a:rPr lang="de-DE" smtClean="0"/>
-              <a:t>26.10.2016</a:t>
             </a:fld>
             <a:endParaRPr lang="de-DE"/>
           </a:p>
@@ -450,18 +446,12 @@
           <a:p>
             <a:fld id="{0FB62DCA-0B20-42A2-BB4B-D17462E2EB2D}" type="slidenum">
               <a:rPr lang="de-DE" smtClean="0"/>
-              <a:t>‹Nr.›</a:t>
             </a:fld>
             <a:endParaRPr lang="de-DE"/>
           </a:p>
         </p:txBody>
       </p:sp>
     </p:spTree>
-    <p:extLst>
-      <p:ext uri="{BB962C8B-B14F-4D97-AF65-F5344CB8AC3E}">
-        <p14:creationId xmlns:p14="http://schemas.microsoft.com/office/powerpoint/2010/main" val="146562521"/>
-      </p:ext>
-    </p:extLst>
   </p:cSld>
   <p:clrMapOvr>
     <a:masterClrMapping/>
@@ -493,13 +483,13 @@
             <a:spLocks noGrp="1"/>
           </p:cNvSpPr>
           <p:nvPr>
-            <p:ph type="title" orient="vert"/>
+            <p:ph type="title" orient="vert" hasCustomPrompt="1"/>
           </p:nvPr>
         </p:nvSpPr>
         <p:spPr>
           <a:xfrm>
-            <a:off x="8724900" y="365125"/>
-            <a:ext cx="2628900" cy="5811838"/>
+            <a:off x="4088509" y="365125"/>
+            <a:ext cx="1231909" cy="5811838"/>
           </a:xfrm>
         </p:spPr>
         <p:txBody>
@@ -521,13 +511,13 @@
             <a:spLocks noGrp="1"/>
           </p:cNvSpPr>
           <p:nvPr>
-            <p:ph type="body" orient="vert" idx="1"/>
+            <p:ph type="body" orient="vert" idx="1" hasCustomPrompt="1"/>
           </p:nvPr>
         </p:nvSpPr>
         <p:spPr>
           <a:xfrm>
-            <a:off x="838200" y="365125"/>
-            <a:ext cx="7734300" cy="5811838"/>
+            <a:off x="392783" y="365125"/>
+            <a:ext cx="3624312" cy="5811838"/>
           </a:xfrm>
         </p:spPr>
         <p:txBody>
@@ -539,6 +529,7 @@
               <a:rPr lang="de-DE" smtClean="0"/>
               <a:t>Textmasterformat bearbeiten</a:t>
             </a:r>
+            <a:endParaRPr lang="de-DE" smtClean="0"/>
           </a:p>
           <a:p>
             <a:pPr lvl="1"/>
@@ -546,6 +537,7 @@
               <a:rPr lang="de-DE" smtClean="0"/>
               <a:t>Zweite Ebene</a:t>
             </a:r>
+            <a:endParaRPr lang="de-DE" smtClean="0"/>
           </a:p>
           <a:p>
             <a:pPr lvl="2"/>
@@ -553,6 +545,7 @@
               <a:rPr lang="de-DE" smtClean="0"/>
               <a:t>Dritte Ebene</a:t>
             </a:r>
+            <a:endParaRPr lang="de-DE" smtClean="0"/>
           </a:p>
           <a:p>
             <a:pPr lvl="3"/>
@@ -560,6 +553,7 @@
               <a:rPr lang="de-DE" smtClean="0"/>
               <a:t>Vierte Ebene</a:t>
             </a:r>
+            <a:endParaRPr lang="de-DE" smtClean="0"/>
           </a:p>
           <a:p>
             <a:pPr lvl="4"/>
@@ -588,7 +582,6 @@
           <a:p>
             <a:fld id="{C2ADCA39-2348-471A-8528-7B6A933769FF}" type="datetimeFigureOut">
               <a:rPr lang="de-DE" smtClean="0"/>
-              <a:t>26.10.2016</a:t>
             </a:fld>
             <a:endParaRPr lang="de-DE"/>
           </a:p>
@@ -630,18 +623,12 @@
           <a:p>
             <a:fld id="{0FB62DCA-0B20-42A2-BB4B-D17462E2EB2D}" type="slidenum">
               <a:rPr lang="de-DE" smtClean="0"/>
-              <a:t>‹Nr.›</a:t>
             </a:fld>
             <a:endParaRPr lang="de-DE"/>
           </a:p>
         </p:txBody>
       </p:sp>
     </p:spTree>
-    <p:extLst>
-      <p:ext uri="{BB962C8B-B14F-4D97-AF65-F5344CB8AC3E}">
-        <p14:creationId xmlns:p14="http://schemas.microsoft.com/office/powerpoint/2010/main" val="2323315007"/>
-      </p:ext>
-    </p:extLst>
   </p:cSld>
   <p:clrMapOvr>
     <a:masterClrMapping/>
@@ -673,7 +660,7 @@
             <a:spLocks noGrp="1"/>
           </p:cNvSpPr>
           <p:nvPr>
-            <p:ph type="title"/>
+            <p:ph type="title" hasCustomPrompt="1"/>
           </p:nvPr>
         </p:nvSpPr>
         <p:spPr/>
@@ -696,7 +683,7 @@
             <a:spLocks noGrp="1"/>
           </p:cNvSpPr>
           <p:nvPr>
-            <p:ph idx="1"/>
+            <p:ph idx="1" hasCustomPrompt="1"/>
           </p:nvPr>
         </p:nvSpPr>
         <p:spPr/>
@@ -709,6 +696,7 @@
               <a:rPr lang="de-DE" smtClean="0"/>
               <a:t>Textmasterformat bearbeiten</a:t>
             </a:r>
+            <a:endParaRPr lang="de-DE" smtClean="0"/>
           </a:p>
           <a:p>
             <a:pPr lvl="1"/>
@@ -716,6 +704,7 @@
               <a:rPr lang="de-DE" smtClean="0"/>
               <a:t>Zweite Ebene</a:t>
             </a:r>
+            <a:endParaRPr lang="de-DE" smtClean="0"/>
           </a:p>
           <a:p>
             <a:pPr lvl="2"/>
@@ -723,6 +712,7 @@
               <a:rPr lang="de-DE" smtClean="0"/>
               <a:t>Dritte Ebene</a:t>
             </a:r>
+            <a:endParaRPr lang="de-DE" smtClean="0"/>
           </a:p>
           <a:p>
             <a:pPr lvl="3"/>
@@ -730,6 +720,7 @@
               <a:rPr lang="de-DE" smtClean="0"/>
               <a:t>Vierte Ebene</a:t>
             </a:r>
+            <a:endParaRPr lang="de-DE" smtClean="0"/>
           </a:p>
           <a:p>
             <a:pPr lvl="4"/>
@@ -758,7 +749,6 @@
           <a:p>
             <a:fld id="{C2ADCA39-2348-471A-8528-7B6A933769FF}" type="datetimeFigureOut">
               <a:rPr lang="de-DE" smtClean="0"/>
-              <a:t>26.10.2016</a:t>
             </a:fld>
             <a:endParaRPr lang="de-DE"/>
           </a:p>
@@ -800,18 +790,12 @@
           <a:p>
             <a:fld id="{0FB62DCA-0B20-42A2-BB4B-D17462E2EB2D}" type="slidenum">
               <a:rPr lang="de-DE" smtClean="0"/>
-              <a:t>‹Nr.›</a:t>
             </a:fld>
             <a:endParaRPr lang="de-DE"/>
           </a:p>
         </p:txBody>
       </p:sp>
     </p:spTree>
-    <p:extLst>
-      <p:ext uri="{BB962C8B-B14F-4D97-AF65-F5344CB8AC3E}">
-        <p14:creationId xmlns:p14="http://schemas.microsoft.com/office/powerpoint/2010/main" val="977597259"/>
-      </p:ext>
-    </p:extLst>
   </p:cSld>
   <p:clrMapOvr>
     <a:masterClrMapping/>
@@ -843,20 +827,20 @@
             <a:spLocks noGrp="1"/>
           </p:cNvSpPr>
           <p:nvPr>
-            <p:ph type="title"/>
+            <p:ph type="title" hasCustomPrompt="1"/>
           </p:nvPr>
         </p:nvSpPr>
         <p:spPr>
           <a:xfrm>
-            <a:off x="831850" y="1709738"/>
-            <a:ext cx="10515600" cy="2852737"/>
+            <a:off x="389807" y="1709738"/>
+            <a:ext cx="4927635" cy="2852737"/>
           </a:xfrm>
         </p:spPr>
         <p:txBody>
           <a:bodyPr anchor="b"/>
           <a:lstStyle>
             <a:lvl1pPr>
-              <a:defRPr sz="6000"/>
+              <a:defRPr sz="3750"/>
             </a:lvl1pPr>
           </a:lstStyle>
           <a:p>
@@ -875,13 +859,13 @@
             <a:spLocks noGrp="1"/>
           </p:cNvSpPr>
           <p:nvPr>
-            <p:ph type="body" idx="1"/>
+            <p:ph type="body" idx="1" hasCustomPrompt="1"/>
           </p:nvPr>
         </p:nvSpPr>
         <p:spPr>
           <a:xfrm>
-            <a:off x="831850" y="4589463"/>
-            <a:ext cx="10515600" cy="1500187"/>
+            <a:off x="389807" y="4589463"/>
+            <a:ext cx="4927635" cy="1500187"/>
           </a:xfrm>
         </p:spPr>
         <p:txBody>
@@ -889,7 +873,7 @@
           <a:lstStyle>
             <a:lvl1pPr marL="0" indent="0">
               <a:buNone/>
-              <a:defRPr sz="2400">
+              <a:defRPr sz="1500">
                 <a:solidFill>
                   <a:schemeClr val="tx1">
                     <a:tint val="75000"/>
@@ -897,9 +881,9 @@
                 </a:solidFill>
               </a:defRPr>
             </a:lvl1pPr>
-            <a:lvl2pPr marL="457200" indent="0">
-              <a:buNone/>
-              <a:defRPr sz="2000">
+            <a:lvl2pPr marL="285750" indent="0">
+              <a:buNone/>
+              <a:defRPr sz="1250">
                 <a:solidFill>
                   <a:schemeClr val="tx1">
                     <a:tint val="75000"/>
@@ -907,9 +891,9 @@
                 </a:solidFill>
               </a:defRPr>
             </a:lvl2pPr>
-            <a:lvl3pPr marL="914400" indent="0">
-              <a:buNone/>
-              <a:defRPr sz="1800">
+            <a:lvl3pPr marL="571500" indent="0">
+              <a:buNone/>
+              <a:defRPr sz="1125">
                 <a:solidFill>
                   <a:schemeClr val="tx1">
                     <a:tint val="75000"/>
@@ -917,9 +901,9 @@
                 </a:solidFill>
               </a:defRPr>
             </a:lvl3pPr>
-            <a:lvl4pPr marL="1371600" indent="0">
-              <a:buNone/>
-              <a:defRPr sz="1600">
+            <a:lvl4pPr marL="857250" indent="0">
+              <a:buNone/>
+              <a:defRPr sz="1000">
                 <a:solidFill>
                   <a:schemeClr val="tx1">
                     <a:tint val="75000"/>
@@ -927,9 +911,9 @@
                 </a:solidFill>
               </a:defRPr>
             </a:lvl4pPr>
-            <a:lvl5pPr marL="1828800" indent="0">
-              <a:buNone/>
-              <a:defRPr sz="1600">
+            <a:lvl5pPr marL="1142365" indent="0">
+              <a:buNone/>
+              <a:defRPr sz="1000">
                 <a:solidFill>
                   <a:schemeClr val="tx1">
                     <a:tint val="75000"/>
@@ -937,9 +921,9 @@
                 </a:solidFill>
               </a:defRPr>
             </a:lvl5pPr>
-            <a:lvl6pPr marL="2286000" indent="0">
-              <a:buNone/>
-              <a:defRPr sz="1600">
+            <a:lvl6pPr marL="1428115" indent="0">
+              <a:buNone/>
+              <a:defRPr sz="1000">
                 <a:solidFill>
                   <a:schemeClr val="tx1">
                     <a:tint val="75000"/>
@@ -947,9 +931,9 @@
                 </a:solidFill>
               </a:defRPr>
             </a:lvl6pPr>
-            <a:lvl7pPr marL="2743200" indent="0">
-              <a:buNone/>
-              <a:defRPr sz="1600">
+            <a:lvl7pPr marL="1713865" indent="0">
+              <a:buNone/>
+              <a:defRPr sz="1000">
                 <a:solidFill>
                   <a:schemeClr val="tx1">
                     <a:tint val="75000"/>
@@ -957,9 +941,9 @@
                 </a:solidFill>
               </a:defRPr>
             </a:lvl7pPr>
-            <a:lvl8pPr marL="3200400" indent="0">
-              <a:buNone/>
-              <a:defRPr sz="1600">
+            <a:lvl8pPr marL="1999615" indent="0">
+              <a:buNone/>
+              <a:defRPr sz="1000">
                 <a:solidFill>
                   <a:schemeClr val="tx1">
                     <a:tint val="75000"/>
@@ -967,9 +951,9 @@
                 </a:solidFill>
               </a:defRPr>
             </a:lvl8pPr>
-            <a:lvl9pPr marL="3657600" indent="0">
-              <a:buNone/>
-              <a:defRPr sz="1600">
+            <a:lvl9pPr marL="2285365" indent="0">
+              <a:buNone/>
+              <a:defRPr sz="1000">
                 <a:solidFill>
                   <a:schemeClr val="tx1">
                     <a:tint val="75000"/>
@@ -984,6 +968,7 @@
               <a:rPr lang="de-DE" smtClean="0"/>
               <a:t>Textmasterformat bearbeiten</a:t>
             </a:r>
+            <a:endParaRPr lang="de-DE" smtClean="0"/>
           </a:p>
         </p:txBody>
       </p:sp>
@@ -1004,7 +989,6 @@
           <a:p>
             <a:fld id="{C2ADCA39-2348-471A-8528-7B6A933769FF}" type="datetimeFigureOut">
               <a:rPr lang="de-DE" smtClean="0"/>
-              <a:t>26.10.2016</a:t>
             </a:fld>
             <a:endParaRPr lang="de-DE"/>
           </a:p>
@@ -1046,18 +1030,12 @@
           <a:p>
             <a:fld id="{0FB62DCA-0B20-42A2-BB4B-D17462E2EB2D}" type="slidenum">
               <a:rPr lang="de-DE" smtClean="0"/>
-              <a:t>‹Nr.›</a:t>
             </a:fld>
             <a:endParaRPr lang="de-DE"/>
           </a:p>
         </p:txBody>
       </p:sp>
     </p:spTree>
-    <p:extLst>
-      <p:ext uri="{BB962C8B-B14F-4D97-AF65-F5344CB8AC3E}">
-        <p14:creationId xmlns:p14="http://schemas.microsoft.com/office/powerpoint/2010/main" val="3258651124"/>
-      </p:ext>
-    </p:extLst>
   </p:cSld>
   <p:clrMapOvr>
     <a:masterClrMapping/>
@@ -1089,7 +1067,7 @@
             <a:spLocks noGrp="1"/>
           </p:cNvSpPr>
           <p:nvPr>
-            <p:ph type="title"/>
+            <p:ph type="title" hasCustomPrompt="1"/>
           </p:nvPr>
         </p:nvSpPr>
         <p:spPr/>
@@ -1112,13 +1090,13 @@
             <a:spLocks noGrp="1"/>
           </p:cNvSpPr>
           <p:nvPr>
-            <p:ph sz="half" idx="1"/>
+            <p:ph sz="half" idx="1" hasCustomPrompt="1"/>
           </p:nvPr>
         </p:nvSpPr>
         <p:spPr>
           <a:xfrm>
-            <a:off x="838200" y="1825625"/>
-            <a:ext cx="5181600" cy="4351338"/>
+            <a:off x="392783" y="1825625"/>
+            <a:ext cx="2428110" cy="4351338"/>
           </a:xfrm>
         </p:spPr>
         <p:txBody>
@@ -1130,6 +1108,7 @@
               <a:rPr lang="de-DE" smtClean="0"/>
               <a:t>Textmasterformat bearbeiten</a:t>
             </a:r>
+            <a:endParaRPr lang="de-DE" smtClean="0"/>
           </a:p>
           <a:p>
             <a:pPr lvl="1"/>
@@ -1137,6 +1116,7 @@
               <a:rPr lang="de-DE" smtClean="0"/>
               <a:t>Zweite Ebene</a:t>
             </a:r>
+            <a:endParaRPr lang="de-DE" smtClean="0"/>
           </a:p>
           <a:p>
             <a:pPr lvl="2"/>
@@ -1144,6 +1124,7 @@
               <a:rPr lang="de-DE" smtClean="0"/>
               <a:t>Dritte Ebene</a:t>
             </a:r>
+            <a:endParaRPr lang="de-DE" smtClean="0"/>
           </a:p>
           <a:p>
             <a:pPr lvl="3"/>
@@ -1151,6 +1132,7 @@
               <a:rPr lang="de-DE" smtClean="0"/>
               <a:t>Vierte Ebene</a:t>
             </a:r>
+            <a:endParaRPr lang="de-DE" smtClean="0"/>
           </a:p>
           <a:p>
             <a:pPr lvl="4"/>
@@ -1169,13 +1151,13 @@
             <a:spLocks noGrp="1"/>
           </p:cNvSpPr>
           <p:nvPr>
-            <p:ph sz="half" idx="2"/>
+            <p:ph sz="half" idx="2" hasCustomPrompt="1"/>
           </p:nvPr>
         </p:nvSpPr>
         <p:spPr>
           <a:xfrm>
-            <a:off x="6172200" y="1825625"/>
-            <a:ext cx="5181600" cy="4351338"/>
+            <a:off x="2892308" y="1825625"/>
+            <a:ext cx="2428110" cy="4351338"/>
           </a:xfrm>
         </p:spPr>
         <p:txBody>
@@ -1187,6 +1169,7 @@
               <a:rPr lang="de-DE" smtClean="0"/>
               <a:t>Textmasterformat bearbeiten</a:t>
             </a:r>
+            <a:endParaRPr lang="de-DE" smtClean="0"/>
           </a:p>
           <a:p>
             <a:pPr lvl="1"/>
@@ -1194,6 +1177,7 @@
               <a:rPr lang="de-DE" smtClean="0"/>
               <a:t>Zweite Ebene</a:t>
             </a:r>
+            <a:endParaRPr lang="de-DE" smtClean="0"/>
           </a:p>
           <a:p>
             <a:pPr lvl="2"/>
@@ -1201,6 +1185,7 @@
               <a:rPr lang="de-DE" smtClean="0"/>
               <a:t>Dritte Ebene</a:t>
             </a:r>
+            <a:endParaRPr lang="de-DE" smtClean="0"/>
           </a:p>
           <a:p>
             <a:pPr lvl="3"/>
@@ -1208,6 +1193,7 @@
               <a:rPr lang="de-DE" smtClean="0"/>
               <a:t>Vierte Ebene</a:t>
             </a:r>
+            <a:endParaRPr lang="de-DE" smtClean="0"/>
           </a:p>
           <a:p>
             <a:pPr lvl="4"/>
@@ -1236,7 +1222,6 @@
           <a:p>
             <a:fld id="{C2ADCA39-2348-471A-8528-7B6A933769FF}" type="datetimeFigureOut">
               <a:rPr lang="de-DE" smtClean="0"/>
-              <a:t>26.10.2016</a:t>
             </a:fld>
             <a:endParaRPr lang="de-DE"/>
           </a:p>
@@ -1278,18 +1263,12 @@
           <a:p>
             <a:fld id="{0FB62DCA-0B20-42A2-BB4B-D17462E2EB2D}" type="slidenum">
               <a:rPr lang="de-DE" smtClean="0"/>
-              <a:t>‹Nr.›</a:t>
             </a:fld>
             <a:endParaRPr lang="de-DE"/>
           </a:p>
         </p:txBody>
       </p:sp>
     </p:spTree>
-    <p:extLst>
-      <p:ext uri="{BB962C8B-B14F-4D97-AF65-F5344CB8AC3E}">
-        <p14:creationId xmlns:p14="http://schemas.microsoft.com/office/powerpoint/2010/main" val="910272053"/>
-      </p:ext>
-    </p:extLst>
   </p:cSld>
   <p:clrMapOvr>
     <a:masterClrMapping/>
@@ -1321,13 +1300,13 @@
             <a:spLocks noGrp="1"/>
           </p:cNvSpPr>
           <p:nvPr>
-            <p:ph type="title"/>
+            <p:ph type="title" hasCustomPrompt="1"/>
           </p:nvPr>
         </p:nvSpPr>
         <p:spPr>
           <a:xfrm>
-            <a:off x="839788" y="365125"/>
-            <a:ext cx="10515600" cy="1325563"/>
+            <a:off x="393527" y="365125"/>
+            <a:ext cx="4927635" cy="1325563"/>
           </a:xfrm>
         </p:spPr>
         <p:txBody>
@@ -1349,13 +1328,13 @@
             <a:spLocks noGrp="1"/>
           </p:cNvSpPr>
           <p:nvPr>
-            <p:ph type="body" idx="1"/>
+            <p:ph type="body" idx="1" hasCustomPrompt="1"/>
           </p:nvPr>
         </p:nvSpPr>
         <p:spPr>
           <a:xfrm>
-            <a:off x="839788" y="1681163"/>
-            <a:ext cx="5157787" cy="823912"/>
+            <a:off x="393527" y="1681163"/>
+            <a:ext cx="2416951" cy="823912"/>
           </a:xfrm>
         </p:spPr>
         <p:txBody>
@@ -1363,39 +1342,39 @@
           <a:lstStyle>
             <a:lvl1pPr marL="0" indent="0">
               <a:buNone/>
-              <a:defRPr sz="2400" b="1"/>
+              <a:defRPr sz="1500" b="1"/>
             </a:lvl1pPr>
-            <a:lvl2pPr marL="457200" indent="0">
-              <a:buNone/>
-              <a:defRPr sz="2000" b="1"/>
+            <a:lvl2pPr marL="285750" indent="0">
+              <a:buNone/>
+              <a:defRPr sz="1250" b="1"/>
             </a:lvl2pPr>
-            <a:lvl3pPr marL="914400" indent="0">
-              <a:buNone/>
-              <a:defRPr sz="1800" b="1"/>
+            <a:lvl3pPr marL="571500" indent="0">
+              <a:buNone/>
+              <a:defRPr sz="1125" b="1"/>
             </a:lvl3pPr>
-            <a:lvl4pPr marL="1371600" indent="0">
-              <a:buNone/>
-              <a:defRPr sz="1600" b="1"/>
+            <a:lvl4pPr marL="857250" indent="0">
+              <a:buNone/>
+              <a:defRPr sz="1000" b="1"/>
             </a:lvl4pPr>
-            <a:lvl5pPr marL="1828800" indent="0">
-              <a:buNone/>
-              <a:defRPr sz="1600" b="1"/>
+            <a:lvl5pPr marL="1142365" indent="0">
+              <a:buNone/>
+              <a:defRPr sz="1000" b="1"/>
             </a:lvl5pPr>
-            <a:lvl6pPr marL="2286000" indent="0">
-              <a:buNone/>
-              <a:defRPr sz="1600" b="1"/>
+            <a:lvl6pPr marL="1428115" indent="0">
+              <a:buNone/>
+              <a:defRPr sz="1000" b="1"/>
             </a:lvl6pPr>
-            <a:lvl7pPr marL="2743200" indent="0">
-              <a:buNone/>
-              <a:defRPr sz="1600" b="1"/>
+            <a:lvl7pPr marL="1713865" indent="0">
+              <a:buNone/>
+              <a:defRPr sz="1000" b="1"/>
             </a:lvl7pPr>
-            <a:lvl8pPr marL="3200400" indent="0">
-              <a:buNone/>
-              <a:defRPr sz="1600" b="1"/>
+            <a:lvl8pPr marL="1999615" indent="0">
+              <a:buNone/>
+              <a:defRPr sz="1000" b="1"/>
             </a:lvl8pPr>
-            <a:lvl9pPr marL="3657600" indent="0">
-              <a:buNone/>
-              <a:defRPr sz="1600" b="1"/>
+            <a:lvl9pPr marL="2285365" indent="0">
+              <a:buNone/>
+              <a:defRPr sz="1000" b="1"/>
             </a:lvl9pPr>
           </a:lstStyle>
           <a:p>
@@ -1404,6 +1383,7 @@
               <a:rPr lang="de-DE" smtClean="0"/>
               <a:t>Textmasterformat bearbeiten</a:t>
             </a:r>
+            <a:endParaRPr lang="de-DE" smtClean="0"/>
           </a:p>
         </p:txBody>
       </p:sp>
@@ -1414,13 +1394,13 @@
             <a:spLocks noGrp="1"/>
           </p:cNvSpPr>
           <p:nvPr>
-            <p:ph sz="half" idx="2"/>
+            <p:ph sz="half" idx="2" hasCustomPrompt="1"/>
           </p:nvPr>
         </p:nvSpPr>
         <p:spPr>
           <a:xfrm>
-            <a:off x="839788" y="2505075"/>
-            <a:ext cx="5157787" cy="3684588"/>
+            <a:off x="393527" y="2505075"/>
+            <a:ext cx="2416951" cy="3684588"/>
           </a:xfrm>
         </p:spPr>
         <p:txBody>
@@ -1432,6 +1412,7 @@
               <a:rPr lang="de-DE" smtClean="0"/>
               <a:t>Textmasterformat bearbeiten</a:t>
             </a:r>
+            <a:endParaRPr lang="de-DE" smtClean="0"/>
           </a:p>
           <a:p>
             <a:pPr lvl="1"/>
@@ -1439,6 +1420,7 @@
               <a:rPr lang="de-DE" smtClean="0"/>
               <a:t>Zweite Ebene</a:t>
             </a:r>
+            <a:endParaRPr lang="de-DE" smtClean="0"/>
           </a:p>
           <a:p>
             <a:pPr lvl="2"/>
@@ -1446,6 +1428,7 @@
               <a:rPr lang="de-DE" smtClean="0"/>
               <a:t>Dritte Ebene</a:t>
             </a:r>
+            <a:endParaRPr lang="de-DE" smtClean="0"/>
           </a:p>
           <a:p>
             <a:pPr lvl="3"/>
@@ -1453,6 +1436,7 @@
               <a:rPr lang="de-DE" smtClean="0"/>
               <a:t>Vierte Ebene</a:t>
             </a:r>
+            <a:endParaRPr lang="de-DE" smtClean="0"/>
           </a:p>
           <a:p>
             <a:pPr lvl="4"/>
@@ -1471,13 +1455,13 @@
             <a:spLocks noGrp="1"/>
           </p:cNvSpPr>
           <p:nvPr>
-            <p:ph type="body" sz="quarter" idx="3"/>
+            <p:ph type="body" sz="quarter" idx="3" hasCustomPrompt="1"/>
           </p:nvPr>
         </p:nvSpPr>
         <p:spPr>
           <a:xfrm>
-            <a:off x="6172200" y="1681163"/>
-            <a:ext cx="5183188" cy="823912"/>
+            <a:off x="2892308" y="1681163"/>
+            <a:ext cx="2428854" cy="823912"/>
           </a:xfrm>
         </p:spPr>
         <p:txBody>
@@ -1485,39 +1469,39 @@
           <a:lstStyle>
             <a:lvl1pPr marL="0" indent="0">
               <a:buNone/>
-              <a:defRPr sz="2400" b="1"/>
+              <a:defRPr sz="1500" b="1"/>
             </a:lvl1pPr>
-            <a:lvl2pPr marL="457200" indent="0">
-              <a:buNone/>
-              <a:defRPr sz="2000" b="1"/>
+            <a:lvl2pPr marL="285750" indent="0">
+              <a:buNone/>
+              <a:defRPr sz="1250" b="1"/>
             </a:lvl2pPr>
-            <a:lvl3pPr marL="914400" indent="0">
-              <a:buNone/>
-              <a:defRPr sz="1800" b="1"/>
+            <a:lvl3pPr marL="571500" indent="0">
+              <a:buNone/>
+              <a:defRPr sz="1125" b="1"/>
             </a:lvl3pPr>
-            <a:lvl4pPr marL="1371600" indent="0">
-              <a:buNone/>
-              <a:defRPr sz="1600" b="1"/>
+            <a:lvl4pPr marL="857250" indent="0">
+              <a:buNone/>
+              <a:defRPr sz="1000" b="1"/>
             </a:lvl4pPr>
-            <a:lvl5pPr marL="1828800" indent="0">
-              <a:buNone/>
-              <a:defRPr sz="1600" b="1"/>
+            <a:lvl5pPr marL="1142365" indent="0">
+              <a:buNone/>
+              <a:defRPr sz="1000" b="1"/>
             </a:lvl5pPr>
-            <a:lvl6pPr marL="2286000" indent="0">
-              <a:buNone/>
-              <a:defRPr sz="1600" b="1"/>
+            <a:lvl6pPr marL="1428115" indent="0">
+              <a:buNone/>
+              <a:defRPr sz="1000" b="1"/>
             </a:lvl6pPr>
-            <a:lvl7pPr marL="2743200" indent="0">
-              <a:buNone/>
-              <a:defRPr sz="1600" b="1"/>
+            <a:lvl7pPr marL="1713865" indent="0">
+              <a:buNone/>
+              <a:defRPr sz="1000" b="1"/>
             </a:lvl7pPr>
-            <a:lvl8pPr marL="3200400" indent="0">
-              <a:buNone/>
-              <a:defRPr sz="1600" b="1"/>
+            <a:lvl8pPr marL="1999615" indent="0">
+              <a:buNone/>
+              <a:defRPr sz="1000" b="1"/>
             </a:lvl8pPr>
-            <a:lvl9pPr marL="3657600" indent="0">
-              <a:buNone/>
-              <a:defRPr sz="1600" b="1"/>
+            <a:lvl9pPr marL="2285365" indent="0">
+              <a:buNone/>
+              <a:defRPr sz="1000" b="1"/>
             </a:lvl9pPr>
           </a:lstStyle>
           <a:p>
@@ -1526,6 +1510,7 @@
               <a:rPr lang="de-DE" smtClean="0"/>
               <a:t>Textmasterformat bearbeiten</a:t>
             </a:r>
+            <a:endParaRPr lang="de-DE" smtClean="0"/>
           </a:p>
         </p:txBody>
       </p:sp>
@@ -1536,13 +1521,13 @@
             <a:spLocks noGrp="1"/>
           </p:cNvSpPr>
           <p:nvPr>
-            <p:ph sz="quarter" idx="4"/>
+            <p:ph sz="quarter" idx="4" hasCustomPrompt="1"/>
           </p:nvPr>
         </p:nvSpPr>
         <p:spPr>
           <a:xfrm>
-            <a:off x="6172200" y="2505075"/>
-            <a:ext cx="5183188" cy="3684588"/>
+            <a:off x="2892308" y="2505075"/>
+            <a:ext cx="2428854" cy="3684588"/>
           </a:xfrm>
         </p:spPr>
         <p:txBody>
@@ -1554,6 +1539,7 @@
               <a:rPr lang="de-DE" smtClean="0"/>
               <a:t>Textmasterformat bearbeiten</a:t>
             </a:r>
+            <a:endParaRPr lang="de-DE" smtClean="0"/>
           </a:p>
           <a:p>
             <a:pPr lvl="1"/>
@@ -1561,6 +1547,7 @@
               <a:rPr lang="de-DE" smtClean="0"/>
               <a:t>Zweite Ebene</a:t>
             </a:r>
+            <a:endParaRPr lang="de-DE" smtClean="0"/>
           </a:p>
           <a:p>
             <a:pPr lvl="2"/>
@@ -1568,6 +1555,7 @@
               <a:rPr lang="de-DE" smtClean="0"/>
               <a:t>Dritte Ebene</a:t>
             </a:r>
+            <a:endParaRPr lang="de-DE" smtClean="0"/>
           </a:p>
           <a:p>
             <a:pPr lvl="3"/>
@@ -1575,6 +1563,7 @@
               <a:rPr lang="de-DE" smtClean="0"/>
               <a:t>Vierte Ebene</a:t>
             </a:r>
+            <a:endParaRPr lang="de-DE" smtClean="0"/>
           </a:p>
           <a:p>
             <a:pPr lvl="4"/>
@@ -1603,7 +1592,6 @@
           <a:p>
             <a:fld id="{C2ADCA39-2348-471A-8528-7B6A933769FF}" type="datetimeFigureOut">
               <a:rPr lang="de-DE" smtClean="0"/>
-              <a:t>26.10.2016</a:t>
             </a:fld>
             <a:endParaRPr lang="de-DE"/>
           </a:p>
@@ -1645,18 +1633,12 @@
           <a:p>
             <a:fld id="{0FB62DCA-0B20-42A2-BB4B-D17462E2EB2D}" type="slidenum">
               <a:rPr lang="de-DE" smtClean="0"/>
-              <a:t>‹Nr.›</a:t>
             </a:fld>
             <a:endParaRPr lang="de-DE"/>
           </a:p>
         </p:txBody>
       </p:sp>
     </p:spTree>
-    <p:extLst>
-      <p:ext uri="{BB962C8B-B14F-4D97-AF65-F5344CB8AC3E}">
-        <p14:creationId xmlns:p14="http://schemas.microsoft.com/office/powerpoint/2010/main" val="17893316"/>
-      </p:ext>
-    </p:extLst>
   </p:cSld>
   <p:clrMapOvr>
     <a:masterClrMapping/>
@@ -1688,7 +1670,7 @@
             <a:spLocks noGrp="1"/>
           </p:cNvSpPr>
           <p:nvPr>
-            <p:ph type="title"/>
+            <p:ph type="title" hasCustomPrompt="1"/>
           </p:nvPr>
         </p:nvSpPr>
         <p:spPr/>
@@ -1721,7 +1703,6 @@
           <a:p>
             <a:fld id="{C2ADCA39-2348-471A-8528-7B6A933769FF}" type="datetimeFigureOut">
               <a:rPr lang="de-DE" smtClean="0"/>
-              <a:t>26.10.2016</a:t>
             </a:fld>
             <a:endParaRPr lang="de-DE"/>
           </a:p>
@@ -1763,18 +1744,12 @@
           <a:p>
             <a:fld id="{0FB62DCA-0B20-42A2-BB4B-D17462E2EB2D}" type="slidenum">
               <a:rPr lang="de-DE" smtClean="0"/>
-              <a:t>‹Nr.›</a:t>
             </a:fld>
             <a:endParaRPr lang="de-DE"/>
           </a:p>
         </p:txBody>
       </p:sp>
     </p:spTree>
-    <p:extLst>
-      <p:ext uri="{BB962C8B-B14F-4D97-AF65-F5344CB8AC3E}">
-        <p14:creationId xmlns:p14="http://schemas.microsoft.com/office/powerpoint/2010/main" val="2483832420"/>
-      </p:ext>
-    </p:extLst>
   </p:cSld>
   <p:clrMapOvr>
     <a:masterClrMapping/>
@@ -1816,7 +1791,6 @@
           <a:p>
             <a:fld id="{C2ADCA39-2348-471A-8528-7B6A933769FF}" type="datetimeFigureOut">
               <a:rPr lang="de-DE" smtClean="0"/>
-              <a:t>26.10.2016</a:t>
             </a:fld>
             <a:endParaRPr lang="de-DE"/>
           </a:p>
@@ -1858,18 +1832,12 @@
           <a:p>
             <a:fld id="{0FB62DCA-0B20-42A2-BB4B-D17462E2EB2D}" type="slidenum">
               <a:rPr lang="de-DE" smtClean="0"/>
-              <a:t>‹Nr.›</a:t>
             </a:fld>
             <a:endParaRPr lang="de-DE"/>
           </a:p>
         </p:txBody>
       </p:sp>
     </p:spTree>
-    <p:extLst>
-      <p:ext uri="{BB962C8B-B14F-4D97-AF65-F5344CB8AC3E}">
-        <p14:creationId xmlns:p14="http://schemas.microsoft.com/office/powerpoint/2010/main" val="1194496335"/>
-      </p:ext>
-    </p:extLst>
   </p:cSld>
   <p:clrMapOvr>
     <a:masterClrMapping/>
@@ -1901,20 +1869,20 @@
             <a:spLocks noGrp="1"/>
           </p:cNvSpPr>
           <p:nvPr>
-            <p:ph type="title"/>
+            <p:ph type="title" hasCustomPrompt="1"/>
           </p:nvPr>
         </p:nvSpPr>
         <p:spPr>
           <a:xfrm>
-            <a:off x="839788" y="457200"/>
-            <a:ext cx="3932237" cy="1600200"/>
+            <a:off x="393527" y="457200"/>
+            <a:ext cx="1842656" cy="1600200"/>
           </a:xfrm>
         </p:spPr>
         <p:txBody>
           <a:bodyPr anchor="b"/>
           <a:lstStyle>
             <a:lvl1pPr>
-              <a:defRPr sz="3200"/>
+              <a:defRPr sz="2000"/>
             </a:lvl1pPr>
           </a:lstStyle>
           <a:p>
@@ -1933,44 +1901,44 @@
             <a:spLocks noGrp="1"/>
           </p:cNvSpPr>
           <p:nvPr>
-            <p:ph idx="1"/>
+            <p:ph idx="1" hasCustomPrompt="1"/>
           </p:nvPr>
         </p:nvSpPr>
         <p:spPr>
           <a:xfrm>
-            <a:off x="5183188" y="987425"/>
-            <a:ext cx="6172200" cy="4873625"/>
+            <a:off x="2428854" y="987425"/>
+            <a:ext cx="2892308" cy="4873625"/>
           </a:xfrm>
         </p:spPr>
         <p:txBody>
           <a:bodyPr/>
           <a:lstStyle>
             <a:lvl1pPr>
-              <a:defRPr sz="3200"/>
+              <a:defRPr sz="2000"/>
             </a:lvl1pPr>
             <a:lvl2pPr>
-              <a:defRPr sz="2800"/>
+              <a:defRPr sz="1750"/>
             </a:lvl2pPr>
             <a:lvl3pPr>
-              <a:defRPr sz="2400"/>
+              <a:defRPr sz="1500"/>
             </a:lvl3pPr>
             <a:lvl4pPr>
-              <a:defRPr sz="2000"/>
+              <a:defRPr sz="1250"/>
             </a:lvl4pPr>
             <a:lvl5pPr>
-              <a:defRPr sz="2000"/>
+              <a:defRPr sz="1250"/>
             </a:lvl5pPr>
             <a:lvl6pPr>
-              <a:defRPr sz="2000"/>
+              <a:defRPr sz="1250"/>
             </a:lvl6pPr>
             <a:lvl7pPr>
-              <a:defRPr sz="2000"/>
+              <a:defRPr sz="1250"/>
             </a:lvl7pPr>
             <a:lvl8pPr>
-              <a:defRPr sz="2000"/>
+              <a:defRPr sz="1250"/>
             </a:lvl8pPr>
             <a:lvl9pPr>
-              <a:defRPr sz="2000"/>
+              <a:defRPr sz="1250"/>
             </a:lvl9pPr>
           </a:lstStyle>
           <a:p>
@@ -1979,6 +1947,7 @@
               <a:rPr lang="de-DE" smtClean="0"/>
               <a:t>Textmasterformat bearbeiten</a:t>
             </a:r>
+            <a:endParaRPr lang="de-DE" smtClean="0"/>
           </a:p>
           <a:p>
             <a:pPr lvl="1"/>
@@ -1986,6 +1955,7 @@
               <a:rPr lang="de-DE" smtClean="0"/>
               <a:t>Zweite Ebene</a:t>
             </a:r>
+            <a:endParaRPr lang="de-DE" smtClean="0"/>
           </a:p>
           <a:p>
             <a:pPr lvl="2"/>
@@ -1993,6 +1963,7 @@
               <a:rPr lang="de-DE" smtClean="0"/>
               <a:t>Dritte Ebene</a:t>
             </a:r>
+            <a:endParaRPr lang="de-DE" smtClean="0"/>
           </a:p>
           <a:p>
             <a:pPr lvl="3"/>
@@ -2000,6 +1971,7 @@
               <a:rPr lang="de-DE" smtClean="0"/>
               <a:t>Vierte Ebene</a:t>
             </a:r>
+            <a:endParaRPr lang="de-DE" smtClean="0"/>
           </a:p>
           <a:p>
             <a:pPr lvl="4"/>
@@ -2018,13 +1990,13 @@
             <a:spLocks noGrp="1"/>
           </p:cNvSpPr>
           <p:nvPr>
-            <p:ph type="body" sz="half" idx="2"/>
+            <p:ph type="body" sz="half" idx="2" hasCustomPrompt="1"/>
           </p:nvPr>
         </p:nvSpPr>
         <p:spPr>
           <a:xfrm>
-            <a:off x="839788" y="2057400"/>
-            <a:ext cx="3932237" cy="3811588"/>
+            <a:off x="393527" y="2057400"/>
+            <a:ext cx="1842656" cy="3811588"/>
           </a:xfrm>
         </p:spPr>
         <p:txBody>
@@ -2032,39 +2004,39 @@
           <a:lstStyle>
             <a:lvl1pPr marL="0" indent="0">
               <a:buNone/>
-              <a:defRPr sz="1600"/>
+              <a:defRPr sz="1000"/>
             </a:lvl1pPr>
-            <a:lvl2pPr marL="457200" indent="0">
-              <a:buNone/>
-              <a:defRPr sz="1400"/>
+            <a:lvl2pPr marL="285750" indent="0">
+              <a:buNone/>
+              <a:defRPr sz="875"/>
             </a:lvl2pPr>
-            <a:lvl3pPr marL="914400" indent="0">
-              <a:buNone/>
-              <a:defRPr sz="1200"/>
+            <a:lvl3pPr marL="571500" indent="0">
+              <a:buNone/>
+              <a:defRPr sz="750"/>
             </a:lvl3pPr>
-            <a:lvl4pPr marL="1371600" indent="0">
-              <a:buNone/>
-              <a:defRPr sz="1000"/>
+            <a:lvl4pPr marL="857250" indent="0">
+              <a:buNone/>
+              <a:defRPr sz="625"/>
             </a:lvl4pPr>
-            <a:lvl5pPr marL="1828800" indent="0">
-              <a:buNone/>
-              <a:defRPr sz="1000"/>
+            <a:lvl5pPr marL="1142365" indent="0">
+              <a:buNone/>
+              <a:defRPr sz="625"/>
             </a:lvl5pPr>
-            <a:lvl6pPr marL="2286000" indent="0">
-              <a:buNone/>
-              <a:defRPr sz="1000"/>
+            <a:lvl6pPr marL="1428115" indent="0">
+              <a:buNone/>
+              <a:defRPr sz="625"/>
             </a:lvl6pPr>
-            <a:lvl7pPr marL="2743200" indent="0">
-              <a:buNone/>
-              <a:defRPr sz="1000"/>
+            <a:lvl7pPr marL="1713865" indent="0">
+              <a:buNone/>
+              <a:defRPr sz="625"/>
             </a:lvl7pPr>
-            <a:lvl8pPr marL="3200400" indent="0">
-              <a:buNone/>
-              <a:defRPr sz="1000"/>
+            <a:lvl8pPr marL="1999615" indent="0">
+              <a:buNone/>
+              <a:defRPr sz="625"/>
             </a:lvl8pPr>
-            <a:lvl9pPr marL="3657600" indent="0">
-              <a:buNone/>
-              <a:defRPr sz="1000"/>
+            <a:lvl9pPr marL="2285365" indent="0">
+              <a:buNone/>
+              <a:defRPr sz="625"/>
             </a:lvl9pPr>
           </a:lstStyle>
           <a:p>
@@ -2073,6 +2045,7 @@
               <a:rPr lang="de-DE" smtClean="0"/>
               <a:t>Textmasterformat bearbeiten</a:t>
             </a:r>
+            <a:endParaRPr lang="de-DE" smtClean="0"/>
           </a:p>
         </p:txBody>
       </p:sp>
@@ -2093,7 +2066,6 @@
           <a:p>
             <a:fld id="{C2ADCA39-2348-471A-8528-7B6A933769FF}" type="datetimeFigureOut">
               <a:rPr lang="de-DE" smtClean="0"/>
-              <a:t>26.10.2016</a:t>
             </a:fld>
             <a:endParaRPr lang="de-DE"/>
           </a:p>
@@ -2135,18 +2107,12 @@
           <a:p>
             <a:fld id="{0FB62DCA-0B20-42A2-BB4B-D17462E2EB2D}" type="slidenum">
               <a:rPr lang="de-DE" smtClean="0"/>
-              <a:t>‹Nr.›</a:t>
             </a:fld>
             <a:endParaRPr lang="de-DE"/>
           </a:p>
         </p:txBody>
       </p:sp>
     </p:spTree>
-    <p:extLst>
-      <p:ext uri="{BB962C8B-B14F-4D97-AF65-F5344CB8AC3E}">
-        <p14:creationId xmlns:p14="http://schemas.microsoft.com/office/powerpoint/2010/main" val="2243359710"/>
-      </p:ext>
-    </p:extLst>
   </p:cSld>
   <p:clrMapOvr>
     <a:masterClrMapping/>
@@ -2178,20 +2144,20 @@
             <a:spLocks noGrp="1"/>
           </p:cNvSpPr>
           <p:nvPr>
-            <p:ph type="title"/>
+            <p:ph type="title" hasCustomPrompt="1"/>
           </p:nvPr>
         </p:nvSpPr>
         <p:spPr>
           <a:xfrm>
-            <a:off x="839788" y="457200"/>
-            <a:ext cx="3932237" cy="1600200"/>
+            <a:off x="393527" y="457200"/>
+            <a:ext cx="1842656" cy="1600200"/>
           </a:xfrm>
         </p:spPr>
         <p:txBody>
           <a:bodyPr anchor="b"/>
           <a:lstStyle>
             <a:lvl1pPr>
-              <a:defRPr sz="3200"/>
+              <a:defRPr sz="2000"/>
             </a:lvl1pPr>
           </a:lstStyle>
           <a:p>
@@ -2215,8 +2181,8 @@
         </p:nvSpPr>
         <p:spPr>
           <a:xfrm>
-            <a:off x="5183188" y="987425"/>
-            <a:ext cx="6172200" cy="4873625"/>
+            <a:off x="2428854" y="987425"/>
+            <a:ext cx="2892308" cy="4873625"/>
           </a:xfrm>
         </p:spPr>
         <p:txBody>
@@ -2224,39 +2190,39 @@
           <a:lstStyle>
             <a:lvl1pPr marL="0" indent="0">
               <a:buNone/>
-              <a:defRPr sz="3200"/>
+              <a:defRPr sz="2000"/>
             </a:lvl1pPr>
-            <a:lvl2pPr marL="457200" indent="0">
-              <a:buNone/>
-              <a:defRPr sz="2800"/>
+            <a:lvl2pPr marL="285750" indent="0">
+              <a:buNone/>
+              <a:defRPr sz="1750"/>
             </a:lvl2pPr>
-            <a:lvl3pPr marL="914400" indent="0">
-              <a:buNone/>
-              <a:defRPr sz="2400"/>
+            <a:lvl3pPr marL="571500" indent="0">
+              <a:buNone/>
+              <a:defRPr sz="1500"/>
             </a:lvl3pPr>
-            <a:lvl4pPr marL="1371600" indent="0">
-              <a:buNone/>
-              <a:defRPr sz="2000"/>
+            <a:lvl4pPr marL="857250" indent="0">
+              <a:buNone/>
+              <a:defRPr sz="1250"/>
             </a:lvl4pPr>
-            <a:lvl5pPr marL="1828800" indent="0">
-              <a:buNone/>
-              <a:defRPr sz="2000"/>
+            <a:lvl5pPr marL="1142365" indent="0">
+              <a:buNone/>
+              <a:defRPr sz="1250"/>
             </a:lvl5pPr>
-            <a:lvl6pPr marL="2286000" indent="0">
-              <a:buNone/>
-              <a:defRPr sz="2000"/>
+            <a:lvl6pPr marL="1428115" indent="0">
+              <a:buNone/>
+              <a:defRPr sz="1250"/>
             </a:lvl6pPr>
-            <a:lvl7pPr marL="2743200" indent="0">
-              <a:buNone/>
-              <a:defRPr sz="2000"/>
+            <a:lvl7pPr marL="1713865" indent="0">
+              <a:buNone/>
+              <a:defRPr sz="1250"/>
             </a:lvl7pPr>
-            <a:lvl8pPr marL="3200400" indent="0">
-              <a:buNone/>
-              <a:defRPr sz="2000"/>
+            <a:lvl8pPr marL="1999615" indent="0">
+              <a:buNone/>
+              <a:defRPr sz="1250"/>
             </a:lvl8pPr>
-            <a:lvl9pPr marL="3657600" indent="0">
-              <a:buNone/>
-              <a:defRPr sz="2000"/>
+            <a:lvl9pPr marL="2285365" indent="0">
+              <a:buNone/>
+              <a:defRPr sz="1250"/>
             </a:lvl9pPr>
           </a:lstStyle>
           <a:p>
@@ -2271,13 +2237,13 @@
             <a:spLocks noGrp="1"/>
           </p:cNvSpPr>
           <p:nvPr>
-            <p:ph type="body" sz="half" idx="2"/>
+            <p:ph type="body" sz="half" idx="2" hasCustomPrompt="1"/>
           </p:nvPr>
         </p:nvSpPr>
         <p:spPr>
           <a:xfrm>
-            <a:off x="839788" y="2057400"/>
-            <a:ext cx="3932237" cy="3811588"/>
+            <a:off x="393527" y="2057400"/>
+            <a:ext cx="1842656" cy="3811588"/>
           </a:xfrm>
         </p:spPr>
         <p:txBody>
@@ -2285,39 +2251,39 @@
           <a:lstStyle>
             <a:lvl1pPr marL="0" indent="0">
               <a:buNone/>
-              <a:defRPr sz="1600"/>
+              <a:defRPr sz="1000"/>
             </a:lvl1pPr>
-            <a:lvl2pPr marL="457200" indent="0">
-              <a:buNone/>
-              <a:defRPr sz="1400"/>
+            <a:lvl2pPr marL="285750" indent="0">
+              <a:buNone/>
+              <a:defRPr sz="875"/>
             </a:lvl2pPr>
-            <a:lvl3pPr marL="914400" indent="0">
-              <a:buNone/>
-              <a:defRPr sz="1200"/>
+            <a:lvl3pPr marL="571500" indent="0">
+              <a:buNone/>
+              <a:defRPr sz="750"/>
             </a:lvl3pPr>
-            <a:lvl4pPr marL="1371600" indent="0">
-              <a:buNone/>
-              <a:defRPr sz="1000"/>
+            <a:lvl4pPr marL="857250" indent="0">
+              <a:buNone/>
+              <a:defRPr sz="625"/>
             </a:lvl4pPr>
-            <a:lvl5pPr marL="1828800" indent="0">
-              <a:buNone/>
-              <a:defRPr sz="1000"/>
+            <a:lvl5pPr marL="1142365" indent="0">
+              <a:buNone/>
+              <a:defRPr sz="625"/>
             </a:lvl5pPr>
-            <a:lvl6pPr marL="2286000" indent="0">
-              <a:buNone/>
-              <a:defRPr sz="1000"/>
+            <a:lvl6pPr marL="1428115" indent="0">
+              <a:buNone/>
+              <a:defRPr sz="625"/>
             </a:lvl6pPr>
-            <a:lvl7pPr marL="2743200" indent="0">
-              <a:buNone/>
-              <a:defRPr sz="1000"/>
+            <a:lvl7pPr marL="1713865" indent="0">
+              <a:buNone/>
+              <a:defRPr sz="625"/>
             </a:lvl7pPr>
-            <a:lvl8pPr marL="3200400" indent="0">
-              <a:buNone/>
-              <a:defRPr sz="1000"/>
+            <a:lvl8pPr marL="1999615" indent="0">
+              <a:buNone/>
+              <a:defRPr sz="625"/>
             </a:lvl8pPr>
-            <a:lvl9pPr marL="3657600" indent="0">
-              <a:buNone/>
-              <a:defRPr sz="1000"/>
+            <a:lvl9pPr marL="2285365" indent="0">
+              <a:buNone/>
+              <a:defRPr sz="625"/>
             </a:lvl9pPr>
           </a:lstStyle>
           <a:p>
@@ -2326,6 +2292,7 @@
               <a:rPr lang="de-DE" smtClean="0"/>
               <a:t>Textmasterformat bearbeiten</a:t>
             </a:r>
+            <a:endParaRPr lang="de-DE" smtClean="0"/>
           </a:p>
         </p:txBody>
       </p:sp>
@@ -2346,7 +2313,6 @@
           <a:p>
             <a:fld id="{C2ADCA39-2348-471A-8528-7B6A933769FF}" type="datetimeFigureOut">
               <a:rPr lang="de-DE" smtClean="0"/>
-              <a:t>26.10.2016</a:t>
             </a:fld>
             <a:endParaRPr lang="de-DE"/>
           </a:p>
@@ -2388,18 +2354,12 @@
           <a:p>
             <a:fld id="{0FB62DCA-0B20-42A2-BB4B-D17462E2EB2D}" type="slidenum">
               <a:rPr lang="de-DE" smtClean="0"/>
-              <a:t>‹Nr.›</a:t>
             </a:fld>
             <a:endParaRPr lang="de-DE"/>
           </a:p>
         </p:txBody>
       </p:sp>
     </p:spTree>
-    <p:extLst>
-      <p:ext uri="{BB962C8B-B14F-4D97-AF65-F5344CB8AC3E}">
-        <p14:creationId xmlns:p14="http://schemas.microsoft.com/office/powerpoint/2010/main" val="1491913476"/>
-      </p:ext>
-    </p:extLst>
   </p:cSld>
   <p:clrMapOvr>
     <a:masterClrMapping/>
@@ -2441,8 +2401,8 @@
         </p:nvSpPr>
         <p:spPr>
           <a:xfrm>
-            <a:off x="838200" y="365125"/>
-            <a:ext cx="10515600" cy="1325563"/>
+            <a:off x="392783" y="365125"/>
+            <a:ext cx="4927635" cy="1325563"/>
           </a:xfrm>
           <a:prstGeom prst="rect">
             <a:avLst/>
@@ -2474,8 +2434,8 @@
         </p:nvSpPr>
         <p:spPr>
           <a:xfrm>
-            <a:off x="838200" y="1825625"/>
-            <a:ext cx="10515600" cy="4351338"/>
+            <a:off x="392783" y="1825625"/>
+            <a:ext cx="4927635" cy="4351338"/>
           </a:xfrm>
           <a:prstGeom prst="rect">
             <a:avLst/>
@@ -2492,6 +2452,7 @@
               <a:rPr lang="de-DE" smtClean="0"/>
               <a:t>Textmasterformat bearbeiten</a:t>
             </a:r>
+            <a:endParaRPr lang="de-DE" smtClean="0"/>
           </a:p>
           <a:p>
             <a:pPr lvl="1"/>
@@ -2499,6 +2460,7 @@
               <a:rPr lang="de-DE" smtClean="0"/>
               <a:t>Zweite Ebene</a:t>
             </a:r>
+            <a:endParaRPr lang="de-DE" smtClean="0"/>
           </a:p>
           <a:p>
             <a:pPr lvl="2"/>
@@ -2506,6 +2468,7 @@
               <a:rPr lang="de-DE" smtClean="0"/>
               <a:t>Dritte Ebene</a:t>
             </a:r>
+            <a:endParaRPr lang="de-DE" smtClean="0"/>
           </a:p>
           <a:p>
             <a:pPr lvl="3"/>
@@ -2513,6 +2476,7 @@
               <a:rPr lang="de-DE" smtClean="0"/>
               <a:t>Vierte Ebene</a:t>
             </a:r>
+            <a:endParaRPr lang="de-DE" smtClean="0"/>
           </a:p>
           <a:p>
             <a:pPr lvl="4"/>
@@ -2536,8 +2500,8 @@
         </p:nvSpPr>
         <p:spPr>
           <a:xfrm>
-            <a:off x="838200" y="6356350"/>
-            <a:ext cx="2743200" cy="365125"/>
+            <a:off x="392783" y="6356350"/>
+            <a:ext cx="1285470" cy="365125"/>
           </a:xfrm>
           <a:prstGeom prst="rect">
             <a:avLst/>
@@ -2547,7 +2511,7 @@
           <a:bodyPr vert="horz" lIns="91440" tIns="45720" rIns="91440" bIns="45720" rtlCol="0" anchor="ctr"/>
           <a:lstStyle>
             <a:lvl1pPr algn="l">
-              <a:defRPr sz="1200">
+              <a:defRPr sz="750">
                 <a:solidFill>
                   <a:schemeClr val="tx1">
                     <a:tint val="75000"/>
@@ -2559,7 +2523,6 @@
           <a:p>
             <a:fld id="{C2ADCA39-2348-471A-8528-7B6A933769FF}" type="datetimeFigureOut">
               <a:rPr lang="de-DE" smtClean="0"/>
-              <a:t>26.10.2016</a:t>
             </a:fld>
             <a:endParaRPr lang="de-DE"/>
           </a:p>
@@ -2577,8 +2540,8 @@
         </p:nvSpPr>
         <p:spPr>
           <a:xfrm>
-            <a:off x="4038600" y="6356350"/>
-            <a:ext cx="4114800" cy="365125"/>
+            <a:off x="1892498" y="6356350"/>
+            <a:ext cx="1928205" cy="365125"/>
           </a:xfrm>
           <a:prstGeom prst="rect">
             <a:avLst/>
@@ -2588,7 +2551,7 @@
           <a:bodyPr vert="horz" lIns="91440" tIns="45720" rIns="91440" bIns="45720" rtlCol="0" anchor="ctr"/>
           <a:lstStyle>
             <a:lvl1pPr algn="ctr">
-              <a:defRPr sz="1200">
+              <a:defRPr sz="750">
                 <a:solidFill>
                   <a:schemeClr val="tx1">
                     <a:tint val="75000"/>
@@ -2614,8 +2577,8 @@
         </p:nvSpPr>
         <p:spPr>
           <a:xfrm>
-            <a:off x="8610600" y="6356350"/>
-            <a:ext cx="2743200" cy="365125"/>
+            <a:off x="4034948" y="6356350"/>
+            <a:ext cx="1285470" cy="365125"/>
           </a:xfrm>
           <a:prstGeom prst="rect">
             <a:avLst/>
@@ -2625,7 +2588,7 @@
           <a:bodyPr vert="horz" lIns="91440" tIns="45720" rIns="91440" bIns="45720" rtlCol="0" anchor="ctr"/>
           <a:lstStyle>
             <a:lvl1pPr algn="r">
-              <a:defRPr sz="1200">
+              <a:defRPr sz="750">
                 <a:solidFill>
                   <a:schemeClr val="tx1">
                     <a:tint val="75000"/>
@@ -2637,18 +2600,12 @@
           <a:p>
             <a:fld id="{0FB62DCA-0B20-42A2-BB4B-D17462E2EB2D}" type="slidenum">
               <a:rPr lang="de-DE" smtClean="0"/>
-              <a:t>‹Nr.›</a:t>
             </a:fld>
             <a:endParaRPr lang="de-DE"/>
           </a:p>
         </p:txBody>
       </p:sp>
     </p:spTree>
-    <p:extLst>
-      <p:ext uri="{BB962C8B-B14F-4D97-AF65-F5344CB8AC3E}">
-        <p14:creationId xmlns:p14="http://schemas.microsoft.com/office/powerpoint/2010/main" val="222676144"/>
-      </p:ext>
-    </p:extLst>
   </p:cSld>
   <p:clrMap bg1="lt1" tx1="dk1" bg2="lt2" tx2="dk2" accent1="accent1" accent2="accent2" accent3="accent3" accent4="accent4" accent5="accent5" accent6="accent6" hlink="hlink" folHlink="folHlink"/>
   <p:sldLayoutIdLst>
@@ -2666,7 +2623,7 @@
   </p:sldLayoutIdLst>
   <p:txStyles>
     <p:titleStyle>
-      <a:lvl1pPr algn="l" defTabSz="914400" rtl="0" eaLnBrk="1" latinLnBrk="0" hangingPunct="1">
+      <a:lvl1pPr algn="l" defTabSz="571500" rtl="0" eaLnBrk="1" latinLnBrk="0" hangingPunct="1">
         <a:lnSpc>
           <a:spcPct val="90000"/>
         </a:lnSpc>
@@ -2674,7 +2631,7 @@
           <a:spcPct val="0"/>
         </a:spcBef>
         <a:buNone/>
-        <a:defRPr sz="4400" kern="1200">
+        <a:defRPr sz="2750" kern="1200">
           <a:solidFill>
             <a:schemeClr val="tx1"/>
           </a:solidFill>
@@ -2685,16 +2642,16 @@
       </a:lvl1pPr>
     </p:titleStyle>
     <p:bodyStyle>
-      <a:lvl1pPr marL="228600" indent="-228600" algn="l" defTabSz="914400" rtl="0" eaLnBrk="1" latinLnBrk="0" hangingPunct="1">
+      <a:lvl1pPr marL="142875" indent="-142240" algn="l" defTabSz="571500" rtl="0" eaLnBrk="1" latinLnBrk="0" hangingPunct="1">
         <a:lnSpc>
           <a:spcPct val="90000"/>
         </a:lnSpc>
         <a:spcBef>
-          <a:spcPts val="1000"/>
+          <a:spcPct val="125000"/>
         </a:spcBef>
         <a:buFont typeface="Arial" panose="020B0604020202020204" pitchFamily="34" charset="0"/>
         <a:buChar char="•"/>
-        <a:defRPr sz="2800" kern="1200">
+        <a:defRPr sz="1750" kern="1200">
           <a:solidFill>
             <a:schemeClr val="tx1"/>
           </a:solidFill>
@@ -2703,16 +2660,16 @@
           <a:cs typeface="+mn-cs"/>
         </a:defRPr>
       </a:lvl1pPr>
-      <a:lvl2pPr marL="685800" indent="-228600" algn="l" defTabSz="914400" rtl="0" eaLnBrk="1" latinLnBrk="0" hangingPunct="1">
+      <a:lvl2pPr marL="428625" indent="-142240" algn="l" defTabSz="571500" rtl="0" eaLnBrk="1" latinLnBrk="0" hangingPunct="1">
         <a:lnSpc>
           <a:spcPct val="90000"/>
         </a:lnSpc>
         <a:spcBef>
-          <a:spcPts val="500"/>
+          <a:spcPts val="310"/>
         </a:spcBef>
         <a:buFont typeface="Arial" panose="020B0604020202020204" pitchFamily="34" charset="0"/>
         <a:buChar char="•"/>
-        <a:defRPr sz="2400" kern="1200">
+        <a:defRPr sz="1500" kern="1200">
           <a:solidFill>
             <a:schemeClr val="tx1"/>
           </a:solidFill>
@@ -2721,16 +2678,16 @@
           <a:cs typeface="+mn-cs"/>
         </a:defRPr>
       </a:lvl2pPr>
-      <a:lvl3pPr marL="1143000" indent="-228600" algn="l" defTabSz="914400" rtl="0" eaLnBrk="1" latinLnBrk="0" hangingPunct="1">
+      <a:lvl3pPr marL="714375" indent="-142240" algn="l" defTabSz="571500" rtl="0" eaLnBrk="1" latinLnBrk="0" hangingPunct="1">
         <a:lnSpc>
           <a:spcPct val="90000"/>
         </a:lnSpc>
         <a:spcBef>
-          <a:spcPts val="500"/>
+          <a:spcPts val="310"/>
         </a:spcBef>
         <a:buFont typeface="Arial" panose="020B0604020202020204" pitchFamily="34" charset="0"/>
         <a:buChar char="•"/>
-        <a:defRPr sz="2000" kern="1200">
+        <a:defRPr sz="1250" kern="1200">
           <a:solidFill>
             <a:schemeClr val="tx1"/>
           </a:solidFill>
@@ -2739,16 +2696,16 @@
           <a:cs typeface="+mn-cs"/>
         </a:defRPr>
       </a:lvl3pPr>
-      <a:lvl4pPr marL="1600200" indent="-228600" algn="l" defTabSz="914400" rtl="0" eaLnBrk="1" latinLnBrk="0" hangingPunct="1">
+      <a:lvl4pPr marL="1000125" indent="-142240" algn="l" defTabSz="571500" rtl="0" eaLnBrk="1" latinLnBrk="0" hangingPunct="1">
         <a:lnSpc>
           <a:spcPct val="90000"/>
         </a:lnSpc>
         <a:spcBef>
-          <a:spcPts val="500"/>
+          <a:spcPts val="310"/>
         </a:spcBef>
         <a:buFont typeface="Arial" panose="020B0604020202020204" pitchFamily="34" charset="0"/>
         <a:buChar char="•"/>
-        <a:defRPr sz="1800" kern="1200">
+        <a:defRPr sz="1125" kern="1200">
           <a:solidFill>
             <a:schemeClr val="tx1"/>
           </a:solidFill>
@@ -2757,16 +2714,16 @@
           <a:cs typeface="+mn-cs"/>
         </a:defRPr>
       </a:lvl4pPr>
-      <a:lvl5pPr marL="2057400" indent="-228600" algn="l" defTabSz="914400" rtl="0" eaLnBrk="1" latinLnBrk="0" hangingPunct="1">
+      <a:lvl5pPr marL="1285240" indent="-142240" algn="l" defTabSz="571500" rtl="0" eaLnBrk="1" latinLnBrk="0" hangingPunct="1">
         <a:lnSpc>
           <a:spcPct val="90000"/>
         </a:lnSpc>
         <a:spcBef>
-          <a:spcPts val="500"/>
+          <a:spcPts val="310"/>
         </a:spcBef>
         <a:buFont typeface="Arial" panose="020B0604020202020204" pitchFamily="34" charset="0"/>
         <a:buChar char="•"/>
-        <a:defRPr sz="1800" kern="1200">
+        <a:defRPr sz="1125" kern="1200">
           <a:solidFill>
             <a:schemeClr val="tx1"/>
           </a:solidFill>
@@ -2775,16 +2732,16 @@
           <a:cs typeface="+mn-cs"/>
         </a:defRPr>
       </a:lvl5pPr>
-      <a:lvl6pPr marL="2514600" indent="-228600" algn="l" defTabSz="914400" rtl="0" eaLnBrk="1" latinLnBrk="0" hangingPunct="1">
+      <a:lvl6pPr marL="1570990" indent="-142240" algn="l" defTabSz="571500" rtl="0" eaLnBrk="1" latinLnBrk="0" hangingPunct="1">
         <a:lnSpc>
           <a:spcPct val="90000"/>
         </a:lnSpc>
         <a:spcBef>
-          <a:spcPts val="500"/>
+          <a:spcPts val="310"/>
         </a:spcBef>
         <a:buFont typeface="Arial" panose="020B0604020202020204" pitchFamily="34" charset="0"/>
         <a:buChar char="•"/>
-        <a:defRPr sz="1800" kern="1200">
+        <a:defRPr sz="1125" kern="1200">
           <a:solidFill>
             <a:schemeClr val="tx1"/>
           </a:solidFill>
@@ -2793,16 +2750,16 @@
           <a:cs typeface="+mn-cs"/>
         </a:defRPr>
       </a:lvl6pPr>
-      <a:lvl7pPr marL="2971800" indent="-228600" algn="l" defTabSz="914400" rtl="0" eaLnBrk="1" latinLnBrk="0" hangingPunct="1">
+      <a:lvl7pPr marL="1856740" indent="-142240" algn="l" defTabSz="571500" rtl="0" eaLnBrk="1" latinLnBrk="0" hangingPunct="1">
         <a:lnSpc>
           <a:spcPct val="90000"/>
         </a:lnSpc>
         <a:spcBef>
-          <a:spcPts val="500"/>
+          <a:spcPts val="310"/>
         </a:spcBef>
         <a:buFont typeface="Arial" panose="020B0604020202020204" pitchFamily="34" charset="0"/>
         <a:buChar char="•"/>
-        <a:defRPr sz="1800" kern="1200">
+        <a:defRPr sz="1125" kern="1200">
           <a:solidFill>
             <a:schemeClr val="tx1"/>
           </a:solidFill>
@@ -2811,16 +2768,16 @@
           <a:cs typeface="+mn-cs"/>
         </a:defRPr>
       </a:lvl7pPr>
-      <a:lvl8pPr marL="3429000" indent="-228600" algn="l" defTabSz="914400" rtl="0" eaLnBrk="1" latinLnBrk="0" hangingPunct="1">
+      <a:lvl8pPr marL="2142490" indent="-142240" algn="l" defTabSz="571500" rtl="0" eaLnBrk="1" latinLnBrk="0" hangingPunct="1">
         <a:lnSpc>
           <a:spcPct val="90000"/>
         </a:lnSpc>
         <a:spcBef>
-          <a:spcPts val="500"/>
+          <a:spcPts val="310"/>
         </a:spcBef>
         <a:buFont typeface="Arial" panose="020B0604020202020204" pitchFamily="34" charset="0"/>
         <a:buChar char="•"/>
-        <a:defRPr sz="1800" kern="1200">
+        <a:defRPr sz="1125" kern="1200">
           <a:solidFill>
             <a:schemeClr val="tx1"/>
           </a:solidFill>
@@ -2829,16 +2786,16 @@
           <a:cs typeface="+mn-cs"/>
         </a:defRPr>
       </a:lvl8pPr>
-      <a:lvl9pPr marL="3886200" indent="-228600" algn="l" defTabSz="914400" rtl="0" eaLnBrk="1" latinLnBrk="0" hangingPunct="1">
+      <a:lvl9pPr marL="2428240" indent="-142240" algn="l" defTabSz="571500" rtl="0" eaLnBrk="1" latinLnBrk="0" hangingPunct="1">
         <a:lnSpc>
           <a:spcPct val="90000"/>
         </a:lnSpc>
         <a:spcBef>
-          <a:spcPts val="500"/>
+          <a:spcPts val="310"/>
         </a:spcBef>
         <a:buFont typeface="Arial" panose="020B0604020202020204" pitchFamily="34" charset="0"/>
         <a:buChar char="•"/>
-        <a:defRPr sz="1800" kern="1200">
+        <a:defRPr sz="1125" kern="1200">
           <a:solidFill>
             <a:schemeClr val="tx1"/>
           </a:solidFill>
@@ -2852,8 +2809,8 @@
       <a:defPPr>
         <a:defRPr lang="de-DE"/>
       </a:defPPr>
-      <a:lvl1pPr marL="0" algn="l" defTabSz="914400" rtl="0" eaLnBrk="1" latinLnBrk="0" hangingPunct="1">
-        <a:defRPr sz="1800" kern="1200">
+      <a:lvl1pPr marL="0" algn="l" defTabSz="571500" rtl="0" eaLnBrk="1" latinLnBrk="0" hangingPunct="1">
+        <a:defRPr sz="1125" kern="1200">
           <a:solidFill>
             <a:schemeClr val="tx1"/>
           </a:solidFill>
@@ -2862,8 +2819,8 @@
           <a:cs typeface="+mn-cs"/>
         </a:defRPr>
       </a:lvl1pPr>
-      <a:lvl2pPr marL="457200" algn="l" defTabSz="914400" rtl="0" eaLnBrk="1" latinLnBrk="0" hangingPunct="1">
-        <a:defRPr sz="1800" kern="1200">
+      <a:lvl2pPr marL="285750" algn="l" defTabSz="571500" rtl="0" eaLnBrk="1" latinLnBrk="0" hangingPunct="1">
+        <a:defRPr sz="1125" kern="1200">
           <a:solidFill>
             <a:schemeClr val="tx1"/>
           </a:solidFill>
@@ -2872,8 +2829,8 @@
           <a:cs typeface="+mn-cs"/>
         </a:defRPr>
       </a:lvl2pPr>
-      <a:lvl3pPr marL="914400" algn="l" defTabSz="914400" rtl="0" eaLnBrk="1" latinLnBrk="0" hangingPunct="1">
-        <a:defRPr sz="1800" kern="1200">
+      <a:lvl3pPr marL="571500" algn="l" defTabSz="571500" rtl="0" eaLnBrk="1" latinLnBrk="0" hangingPunct="1">
+        <a:defRPr sz="1125" kern="1200">
           <a:solidFill>
             <a:schemeClr val="tx1"/>
           </a:solidFill>
@@ -2882,8 +2839,8 @@
           <a:cs typeface="+mn-cs"/>
         </a:defRPr>
       </a:lvl3pPr>
-      <a:lvl4pPr marL="1371600" algn="l" defTabSz="914400" rtl="0" eaLnBrk="1" latinLnBrk="0" hangingPunct="1">
-        <a:defRPr sz="1800" kern="1200">
+      <a:lvl4pPr marL="857250" algn="l" defTabSz="571500" rtl="0" eaLnBrk="1" latinLnBrk="0" hangingPunct="1">
+        <a:defRPr sz="1125" kern="1200">
           <a:solidFill>
             <a:schemeClr val="tx1"/>
           </a:solidFill>
@@ -2892,8 +2849,8 @@
           <a:cs typeface="+mn-cs"/>
         </a:defRPr>
       </a:lvl4pPr>
-      <a:lvl5pPr marL="1828800" algn="l" defTabSz="914400" rtl="0" eaLnBrk="1" latinLnBrk="0" hangingPunct="1">
-        <a:defRPr sz="1800" kern="1200">
+      <a:lvl5pPr marL="1142365" algn="l" defTabSz="571500" rtl="0" eaLnBrk="1" latinLnBrk="0" hangingPunct="1">
+        <a:defRPr sz="1125" kern="1200">
           <a:solidFill>
             <a:schemeClr val="tx1"/>
           </a:solidFill>
@@ -2902,8 +2859,8 @@
           <a:cs typeface="+mn-cs"/>
         </a:defRPr>
       </a:lvl5pPr>
-      <a:lvl6pPr marL="2286000" algn="l" defTabSz="914400" rtl="0" eaLnBrk="1" latinLnBrk="0" hangingPunct="1">
-        <a:defRPr sz="1800" kern="1200">
+      <a:lvl6pPr marL="1428115" algn="l" defTabSz="571500" rtl="0" eaLnBrk="1" latinLnBrk="0" hangingPunct="1">
+        <a:defRPr sz="1125" kern="1200">
           <a:solidFill>
             <a:schemeClr val="tx1"/>
           </a:solidFill>
@@ -2912,8 +2869,8 @@
           <a:cs typeface="+mn-cs"/>
         </a:defRPr>
       </a:lvl6pPr>
-      <a:lvl7pPr marL="2743200" algn="l" defTabSz="914400" rtl="0" eaLnBrk="1" latinLnBrk="0" hangingPunct="1">
-        <a:defRPr sz="1800" kern="1200">
+      <a:lvl7pPr marL="1713865" algn="l" defTabSz="571500" rtl="0" eaLnBrk="1" latinLnBrk="0" hangingPunct="1">
+        <a:defRPr sz="1125" kern="1200">
           <a:solidFill>
             <a:schemeClr val="tx1"/>
           </a:solidFill>
@@ -2922,8 +2879,8 @@
           <a:cs typeface="+mn-cs"/>
         </a:defRPr>
       </a:lvl7pPr>
-      <a:lvl8pPr marL="3200400" algn="l" defTabSz="914400" rtl="0" eaLnBrk="1" latinLnBrk="0" hangingPunct="1">
-        <a:defRPr sz="1800" kern="1200">
+      <a:lvl8pPr marL="1999615" algn="l" defTabSz="571500" rtl="0" eaLnBrk="1" latinLnBrk="0" hangingPunct="1">
+        <a:defRPr sz="1125" kern="1200">
           <a:solidFill>
             <a:schemeClr val="tx1"/>
           </a:solidFill>
@@ -2932,8 +2889,8 @@
           <a:cs typeface="+mn-cs"/>
         </a:defRPr>
       </a:lvl8pPr>
-      <a:lvl9pPr marL="3657600" algn="l" defTabSz="914400" rtl="0" eaLnBrk="1" latinLnBrk="0" hangingPunct="1">
-        <a:defRPr sz="1800" kern="1200">
+      <a:lvl9pPr marL="2285365" algn="l" defTabSz="571500" rtl="0" eaLnBrk="1" latinLnBrk="0" hangingPunct="1">
+        <a:defRPr sz="1125" kern="1200">
           <a:solidFill>
             <a:schemeClr val="tx1"/>
           </a:solidFill>
@@ -2973,14 +2930,14 @@
           <p:nvPr/>
         </p:nvPicPr>
         <p:blipFill>
-          <a:blip r:embed="rId2"/>
+          <a:blip r:embed="rId1"/>
           <a:stretch>
             <a:fillRect/>
           </a:stretch>
         </p:blipFill>
         <p:spPr>
           <a:xfrm>
-            <a:off x="1287266" y="0"/>
+            <a:off x="31606" y="13335"/>
             <a:ext cx="3680220" cy="2154276"/>
           </a:xfrm>
           <a:prstGeom prst="rect">
@@ -2997,14 +2954,14 @@
           <p:nvPr/>
         </p:nvPicPr>
         <p:blipFill>
-          <a:blip r:embed="rId3"/>
+          <a:blip r:embed="rId2"/>
           <a:stretch>
             <a:fillRect/>
           </a:stretch>
         </p:blipFill>
         <p:spPr>
-          <a:xfrm rot="797043">
-            <a:off x="3393469" y="4108805"/>
+          <a:xfrm rot="1037041">
+            <a:off x="2786779" y="4251680"/>
             <a:ext cx="3693132" cy="3254208"/>
           </a:xfrm>
           <a:prstGeom prst="rect">
@@ -3020,8 +2977,8 @@
         </p:nvSpPr>
         <p:spPr>
           <a:xfrm>
-            <a:off x="3200400" y="1816573"/>
-            <a:ext cx="1485900" cy="2329977"/>
+            <a:off x="1945005" y="1830070"/>
+            <a:ext cx="2081530" cy="2472055"/>
           </a:xfrm>
           <a:custGeom>
             <a:avLst/>
@@ -3090,11 +3047,6 @@
         </p:txBody>
       </p:sp>
     </p:spTree>
-    <p:extLst>
-      <p:ext uri="{BB962C8B-B14F-4D97-AF65-F5344CB8AC3E}">
-        <p14:creationId xmlns:p14="http://schemas.microsoft.com/office/powerpoint/2010/main" val="4155760256"/>
-      </p:ext>
-    </p:extLst>
   </p:cSld>
   <p:clrMapOvr>
     <a:masterClrMapping/>
@@ -3145,7 +3097,7 @@
     </a:clrScheme>
     <a:fontScheme name="Office">
       <a:majorFont>
-        <a:latin typeface="Calibri Light" panose="020F0302020204030204"/>
+        <a:latin typeface="Calibri Light"/>
         <a:ea typeface=""/>
         <a:cs typeface=""/>
         <a:font script="Jpan" typeface="ＭＳ Ｐゴシック"/>
@@ -3180,7 +3132,7 @@
         <a:font script="Geor" typeface="Sylfaen"/>
       </a:majorFont>
       <a:minorFont>
-        <a:latin typeface="Calibri" panose="020F0502020204030204"/>
+        <a:latin typeface="Calibri"/>
         <a:ea typeface=""/>
         <a:cs typeface=""/>
         <a:font script="Jpan" typeface="ＭＳ Ｐゴシック"/>

</xml_diff>